<commit_message>
modify contents of the chapter 13.
</commit_message>
<xml_diff>
--- a/Sharpest++/Chapter 13 - Quiz & Answer (1~11).pptx
+++ b/Sharpest++/Chapter 13 - Quiz & Answer (1~11).pptx
@@ -240,7 +240,7 @@
           <a:p>
             <a:fld id="{14064E1B-EADF-46E0-B2CF-CBBF37D915B3}" type="datetimeFigureOut">
               <a:rPr lang="ko-KR" altLang="en-US" smtClean="0"/>
-              <a:t>2019-03-19</a:t>
+              <a:t>2019-03-20</a:t>
             </a:fld>
             <a:endParaRPr lang="ko-KR" altLang="en-US"/>
           </a:p>
@@ -3618,7 +3618,7 @@
           <a:p>
             <a:fld id="{9FD3C816-E8FD-4807-9C0F-99A78AC38099}" type="datetimeFigureOut">
               <a:rPr lang="ko-KR" altLang="en-US" smtClean="0"/>
-              <a:t>2019-03-19</a:t>
+              <a:t>2019-03-20</a:t>
             </a:fld>
             <a:endParaRPr lang="ko-KR" altLang="en-US"/>
           </a:p>
@@ -3786,7 +3786,7 @@
           <a:p>
             <a:fld id="{9FD3C816-E8FD-4807-9C0F-99A78AC38099}" type="datetimeFigureOut">
               <a:rPr lang="ko-KR" altLang="en-US" smtClean="0"/>
-              <a:t>2019-03-19</a:t>
+              <a:t>2019-03-20</a:t>
             </a:fld>
             <a:endParaRPr lang="ko-KR" altLang="en-US"/>
           </a:p>
@@ -3964,7 +3964,7 @@
           <a:p>
             <a:fld id="{9FD3C816-E8FD-4807-9C0F-99A78AC38099}" type="datetimeFigureOut">
               <a:rPr lang="ko-KR" altLang="en-US" smtClean="0"/>
-              <a:t>2019-03-19</a:t>
+              <a:t>2019-03-20</a:t>
             </a:fld>
             <a:endParaRPr lang="ko-KR" altLang="en-US"/>
           </a:p>
@@ -4132,7 +4132,7 @@
           <a:p>
             <a:fld id="{9FD3C816-E8FD-4807-9C0F-99A78AC38099}" type="datetimeFigureOut">
               <a:rPr lang="ko-KR" altLang="en-US" smtClean="0"/>
-              <a:t>2019-03-19</a:t>
+              <a:t>2019-03-20</a:t>
             </a:fld>
             <a:endParaRPr lang="ko-KR" altLang="en-US"/>
           </a:p>
@@ -4377,7 +4377,7 @@
           <a:p>
             <a:fld id="{9FD3C816-E8FD-4807-9C0F-99A78AC38099}" type="datetimeFigureOut">
               <a:rPr lang="ko-KR" altLang="en-US" smtClean="0"/>
-              <a:t>2019-03-19</a:t>
+              <a:t>2019-03-20</a:t>
             </a:fld>
             <a:endParaRPr lang="ko-KR" altLang="en-US"/>
           </a:p>
@@ -4662,7 +4662,7 @@
           <a:p>
             <a:fld id="{9FD3C816-E8FD-4807-9C0F-99A78AC38099}" type="datetimeFigureOut">
               <a:rPr lang="ko-KR" altLang="en-US" smtClean="0"/>
-              <a:t>2019-03-19</a:t>
+              <a:t>2019-03-20</a:t>
             </a:fld>
             <a:endParaRPr lang="ko-KR" altLang="en-US"/>
           </a:p>
@@ -5086,7 +5086,7 @@
           <a:p>
             <a:fld id="{9FD3C816-E8FD-4807-9C0F-99A78AC38099}" type="datetimeFigureOut">
               <a:rPr lang="ko-KR" altLang="en-US" smtClean="0"/>
-              <a:t>2019-03-19</a:t>
+              <a:t>2019-03-20</a:t>
             </a:fld>
             <a:endParaRPr lang="ko-KR" altLang="en-US"/>
           </a:p>
@@ -5203,7 +5203,7 @@
           <a:p>
             <a:fld id="{9FD3C816-E8FD-4807-9C0F-99A78AC38099}" type="datetimeFigureOut">
               <a:rPr lang="ko-KR" altLang="en-US" smtClean="0"/>
-              <a:t>2019-03-19</a:t>
+              <a:t>2019-03-20</a:t>
             </a:fld>
             <a:endParaRPr lang="ko-KR" altLang="en-US"/>
           </a:p>
@@ -5298,7 +5298,7 @@
           <a:p>
             <a:fld id="{9FD3C816-E8FD-4807-9C0F-99A78AC38099}" type="datetimeFigureOut">
               <a:rPr lang="ko-KR" altLang="en-US" smtClean="0"/>
-              <a:t>2019-03-19</a:t>
+              <a:t>2019-03-20</a:t>
             </a:fld>
             <a:endParaRPr lang="ko-KR" altLang="en-US"/>
           </a:p>
@@ -5573,7 +5573,7 @@
           <a:p>
             <a:fld id="{9FD3C816-E8FD-4807-9C0F-99A78AC38099}" type="datetimeFigureOut">
               <a:rPr lang="ko-KR" altLang="en-US" smtClean="0"/>
-              <a:t>2019-03-19</a:t>
+              <a:t>2019-03-20</a:t>
             </a:fld>
             <a:endParaRPr lang="ko-KR" altLang="en-US"/>
           </a:p>
@@ -5825,7 +5825,7 @@
           <a:p>
             <a:fld id="{9FD3C816-E8FD-4807-9C0F-99A78AC38099}" type="datetimeFigureOut">
               <a:rPr lang="ko-KR" altLang="en-US" smtClean="0"/>
-              <a:t>2019-03-19</a:t>
+              <a:t>2019-03-20</a:t>
             </a:fld>
             <a:endParaRPr lang="ko-KR" altLang="en-US"/>
           </a:p>
@@ -6046,7 +6046,7 @@
           <a:p>
             <a:fld id="{9FD3C816-E8FD-4807-9C0F-99A78AC38099}" type="datetimeFigureOut">
               <a:rPr lang="ko-KR" altLang="en-US" smtClean="0"/>
-              <a:t>2019-03-19</a:t>
+              <a:t>2019-03-20</a:t>
             </a:fld>
             <a:endParaRPr lang="ko-KR" altLang="en-US"/>
           </a:p>
@@ -13376,12 +13376,72 @@
           </a:p>
         </p:txBody>
       </p:sp>
+      <p:sp>
+        <p:nvSpPr>
+          <p:cNvPr id="8" name="TextBox 7">
+            <a:extLst>
+              <a:ext uri="{FF2B5EF4-FFF2-40B4-BE49-F238E27FC236}">
+                <a16:creationId xmlns:a16="http://schemas.microsoft.com/office/drawing/2014/main" id="{09D10212-084F-4F79-8A98-FC3133A78C8B}"/>
+              </a:ext>
+            </a:extLst>
+          </p:cNvPr>
+          <p:cNvSpPr txBox="1"/>
+          <p:nvPr/>
+        </p:nvSpPr>
+        <p:spPr>
+          <a:xfrm>
+            <a:off x="279917" y="2585987"/>
+            <a:ext cx="10590245" cy="523220"/>
+          </a:xfrm>
+          <a:prstGeom prst="rect">
+            <a:avLst/>
+          </a:prstGeom>
+          <a:noFill/>
+        </p:spPr>
+        <p:txBody>
+          <a:bodyPr wrap="square" rtlCol="0">
+            <a:spAutoFit/>
+          </a:bodyPr>
+          <a:lstStyle/>
+          <a:p>
+            <a:pPr marL="285750" indent="-285750">
+              <a:buFont typeface="Arial" panose="020B0604020202020204" pitchFamily="34" charset="0"/>
+              <a:buChar char="•"/>
+            </a:pPr>
+            <a:r>
+              <a:rPr lang="en-US" altLang="ko-KR" sz="2800" dirty="0">
+                <a:latin typeface="야놀자 야체 R" panose="02020603020101020101" pitchFamily="18" charset="-127"/>
+                <a:ea typeface="야놀자 야체 R" panose="02020603020101020101" pitchFamily="18" charset="-127"/>
+              </a:rPr>
+              <a:t> Q21) </a:t>
+            </a:r>
+            <a:r>
+              <a:rPr lang="ko-KR" altLang="en-US" sz="2800" dirty="0">
+                <a:latin typeface="야놀자 야체 R" panose="02020603020101020101" pitchFamily="18" charset="-127"/>
+                <a:ea typeface="야놀자 야체 R" panose="02020603020101020101" pitchFamily="18" charset="-127"/>
+              </a:rPr>
+              <a:t>아래 코드의 실행 결과는 무엇인가</a:t>
+            </a:r>
+            <a:r>
+              <a:rPr lang="en-US" altLang="ko-KR" sz="2800" dirty="0">
+                <a:latin typeface="야놀자 야체 R" panose="02020603020101020101" pitchFamily="18" charset="-127"/>
+                <a:ea typeface="야놀자 야체 R" panose="02020603020101020101" pitchFamily="18" charset="-127"/>
+              </a:rPr>
+              <a:t>?</a:t>
+            </a:r>
+            <a:endParaRPr lang="ko-KR" altLang="en-US" sz="2800" dirty="0">
+              <a:latin typeface="야놀자 야체 R" panose="02020603020101020101" pitchFamily="18" charset="-127"/>
+              <a:ea typeface="야놀자 야체 R" panose="02020603020101020101" pitchFamily="18" charset="-127"/>
+            </a:endParaRPr>
+          </a:p>
+        </p:txBody>
+      </p:sp>
       <p:pic>
         <p:nvPicPr>
-          <p:cNvPr id="2" name="그림 1">
+          <p:cNvPr id="3" name="그림 2">
             <a:extLst>
               <a:ext uri="{FF2B5EF4-FFF2-40B4-BE49-F238E27FC236}">
-                <a16:creationId xmlns:a16="http://schemas.microsoft.com/office/drawing/2014/main" id="{DB66C498-5B5E-4971-88E9-CF084170602D}"/>
+                <a16:creationId xmlns:a16="http://schemas.microsoft.com/office/drawing/2014/main" id="{111F3B7F-2068-4EC4-A89C-4C032605009D}"/>
               </a:ext>
             </a:extLst>
           </p:cNvPr>
@@ -13398,74 +13458,14 @@
         </p:blipFill>
         <p:spPr>
           <a:xfrm>
-            <a:off x="2811378" y="3417115"/>
-            <a:ext cx="6569243" cy="3159452"/>
+            <a:off x="3268057" y="3417115"/>
+            <a:ext cx="5655886" cy="2949141"/>
           </a:xfrm>
           <a:prstGeom prst="rect">
             <a:avLst/>
           </a:prstGeom>
         </p:spPr>
       </p:pic>
-      <p:sp>
-        <p:nvSpPr>
-          <p:cNvPr id="8" name="TextBox 7">
-            <a:extLst>
-              <a:ext uri="{FF2B5EF4-FFF2-40B4-BE49-F238E27FC236}">
-                <a16:creationId xmlns:a16="http://schemas.microsoft.com/office/drawing/2014/main" id="{09D10212-084F-4F79-8A98-FC3133A78C8B}"/>
-              </a:ext>
-            </a:extLst>
-          </p:cNvPr>
-          <p:cNvSpPr txBox="1"/>
-          <p:nvPr/>
-        </p:nvSpPr>
-        <p:spPr>
-          <a:xfrm>
-            <a:off x="279917" y="2585987"/>
-            <a:ext cx="10590245" cy="523220"/>
-          </a:xfrm>
-          <a:prstGeom prst="rect">
-            <a:avLst/>
-          </a:prstGeom>
-          <a:noFill/>
-        </p:spPr>
-        <p:txBody>
-          <a:bodyPr wrap="square" rtlCol="0">
-            <a:spAutoFit/>
-          </a:bodyPr>
-          <a:lstStyle/>
-          <a:p>
-            <a:pPr marL="285750" indent="-285750">
-              <a:buFont typeface="Arial" panose="020B0604020202020204" pitchFamily="34" charset="0"/>
-              <a:buChar char="•"/>
-            </a:pPr>
-            <a:r>
-              <a:rPr lang="en-US" altLang="ko-KR" sz="2800" dirty="0">
-                <a:latin typeface="야놀자 야체 R" panose="02020603020101020101" pitchFamily="18" charset="-127"/>
-                <a:ea typeface="야놀자 야체 R" panose="02020603020101020101" pitchFamily="18" charset="-127"/>
-              </a:rPr>
-              <a:t> Q21) </a:t>
-            </a:r>
-            <a:r>
-              <a:rPr lang="ko-KR" altLang="en-US" sz="2800" dirty="0">
-                <a:latin typeface="야놀자 야체 R" panose="02020603020101020101" pitchFamily="18" charset="-127"/>
-                <a:ea typeface="야놀자 야체 R" panose="02020603020101020101" pitchFamily="18" charset="-127"/>
-              </a:rPr>
-              <a:t>아래 코드의 실행 결과는 무엇인가</a:t>
-            </a:r>
-            <a:r>
-              <a:rPr lang="en-US" altLang="ko-KR" sz="2800" dirty="0">
-                <a:latin typeface="야놀자 야체 R" panose="02020603020101020101" pitchFamily="18" charset="-127"/>
-                <a:ea typeface="야놀자 야체 R" panose="02020603020101020101" pitchFamily="18" charset="-127"/>
-              </a:rPr>
-              <a:t>?</a:t>
-            </a:r>
-            <a:endParaRPr lang="ko-KR" altLang="en-US" sz="2800" dirty="0">
-              <a:latin typeface="야놀자 야체 R" panose="02020603020101020101" pitchFamily="18" charset="-127"/>
-              <a:ea typeface="야놀자 야체 R" panose="02020603020101020101" pitchFamily="18" charset="-127"/>
-            </a:endParaRPr>
-          </a:p>
-        </p:txBody>
-      </p:sp>
     </p:spTree>
     <p:extLst>
       <p:ext uri="{BB962C8B-B14F-4D97-AF65-F5344CB8AC3E}">
@@ -13645,7 +13645,7 @@
                                           </p:stCondLst>
                                         </p:cTn>
                                         <p:tgtEl>
-                                          <p:spTgt spid="2"/>
+                                          <p:spTgt spid="3"/>
                                         </p:tgtEl>
                                         <p:attrNameLst>
                                           <p:attrName>style.visibility</p:attrName>

</xml_diff>